<commit_message>
updated names, research question, and sample data
</commit_message>
<xml_diff>
--- a/reseach_question_presentation_template.pptx
+++ b/reseach_question_presentation_template.pptx
@@ -4769,54 +4769,6 @@
       </p:grpSpPr>
       <p:sp>
         <p:nvSpPr>
-          <p:cNvPr id="2" name="Title 1">
-            <a:extLst>
-              <a:ext uri="{FF2B5EF4-FFF2-40B4-BE49-F238E27FC236}">
-                <a16:creationId xmlns:a16="http://schemas.microsoft.com/office/drawing/2014/main" id="{3440AEE4-CC66-FE42-B0C3-2CC7AFD37D1C}"/>
-              </a:ext>
-            </a:extLst>
-          </p:cNvPr>
-          <p:cNvSpPr>
-            <a:spLocks noGrp="1"/>
-          </p:cNvSpPr>
-          <p:nvPr>
-            <p:ph type="ctrTitle"/>
-          </p:nvPr>
-        </p:nvSpPr>
-        <p:spPr/>
-        <p:txBody>
-          <a:bodyPr>
-            <a:normAutofit fontScale="90000"/>
-          </a:bodyPr>
-          <a:lstStyle/>
-          <a:p>
-            <a:r>
-              <a:rPr lang="en-US" dirty="0"/>
-              <a:t>Research Question – </a:t>
-            </a:r>
-            <a:br>
-              <a:rPr lang="en-US" dirty="0"/>
-            </a:br>
-            <a:r>
-              <a:rPr lang="en-US" sz="4000" dirty="0"/>
-              <a:t>Tutorial Presentation for Feedback</a:t>
-            </a:r>
-            <a:br>
-              <a:rPr lang="en-US" sz="4000" dirty="0"/>
-            </a:br>
-            <a:r>
-              <a:rPr lang="en-US" sz="2000" dirty="0"/>
-              <a:t>Date:  22/11/2024</a:t>
-            </a:r>
-            <a:br>
-              <a:rPr lang="en-US" sz="8000" dirty="0"/>
-            </a:br>
-            <a:endParaRPr lang="en-US" dirty="0"/>
-          </a:p>
-        </p:txBody>
-      </p:sp>
-      <p:sp>
-        <p:nvSpPr>
           <p:cNvPr id="3" name="Subtitle 2">
             <a:extLst>
               <a:ext uri="{FF2B5EF4-FFF2-40B4-BE49-F238E27FC236}">
@@ -4866,8 +4818,8 @@
         </p:nvSpPr>
         <p:spPr>
           <a:xfrm>
-            <a:off x="965289" y="274320"/>
-            <a:ext cx="3744363" cy="736245"/>
+            <a:off x="954001" y="323793"/>
+            <a:ext cx="4822452" cy="488392"/>
           </a:xfrm>
         </p:spPr>
         <p:txBody>
@@ -4875,8 +4827,14 @@
           <a:lstStyle/>
           <a:p>
             <a:r>
+              <a:rPr lang="en-GB" sz="1400" dirty="0"/>
+              <a:t>7COM1079-2024  Student Group No: A169</a:t>
+            </a:r>
+          </a:p>
+          <a:p>
+            <a:r>
               <a:rPr lang="en-GB" dirty="0"/>
-              <a:t>7COM1079-2024  Student Group No: A169</a:t>
+              <a:t>	             	             </a:t>
             </a:r>
           </a:p>
         </p:txBody>
@@ -5083,6 +5041,144 @@
                 <a:schemeClr val="bg2"/>
               </a:solidFill>
             </a:endParaRPr>
+          </a:p>
+        </p:txBody>
+      </p:sp>
+      <p:sp>
+        <p:nvSpPr>
+          <p:cNvPr id="10" name="TextBox 9">
+            <a:extLst>
+              <a:ext uri="{FF2B5EF4-FFF2-40B4-BE49-F238E27FC236}">
+                <a16:creationId xmlns:a16="http://schemas.microsoft.com/office/drawing/2014/main" id="{800B0757-0D26-E67B-533C-745441FF45F7}"/>
+              </a:ext>
+            </a:extLst>
+          </p:cNvPr>
+          <p:cNvSpPr txBox="1"/>
+          <p:nvPr/>
+        </p:nvSpPr>
+        <p:spPr>
+          <a:xfrm>
+            <a:off x="857134" y="2587833"/>
+            <a:ext cx="9763433" cy="892552"/>
+          </a:xfrm>
+          <a:prstGeom prst="rect">
+            <a:avLst/>
+          </a:prstGeom>
+          <a:noFill/>
+        </p:spPr>
+        <p:txBody>
+          <a:bodyPr wrap="square" rtlCol="0">
+            <a:spAutoFit/>
+          </a:bodyPr>
+          <a:lstStyle/>
+          <a:p>
+            <a:r>
+              <a:rPr lang="en-US" sz="2800" b="1" dirty="0">
+                <a:solidFill>
+                  <a:schemeClr val="bg2"/>
+                </a:solidFill>
+              </a:rPr>
+              <a:t>Research question</a:t>
+            </a:r>
+            <a:r>
+              <a:rPr lang="en-US" sz="2800" dirty="0">
+                <a:solidFill>
+                  <a:schemeClr val="bg2"/>
+                </a:solidFill>
+              </a:rPr>
+              <a:t>: </a:t>
+            </a:r>
+            <a:r>
+              <a:rPr lang="en-US" sz="2400" dirty="0">
+                <a:solidFill>
+                  <a:schemeClr val="bg2"/>
+                </a:solidFill>
+              </a:rPr>
+              <a:t>Is there a correlation between a movie's duration and its average votes on IMDb?</a:t>
+            </a:r>
+          </a:p>
+        </p:txBody>
+      </p:sp>
+      <p:sp>
+        <p:nvSpPr>
+          <p:cNvPr id="11" name="TextBox 10">
+            <a:extLst>
+              <a:ext uri="{FF2B5EF4-FFF2-40B4-BE49-F238E27FC236}">
+                <a16:creationId xmlns:a16="http://schemas.microsoft.com/office/drawing/2014/main" id="{E4A7F0B2-31E4-AEBF-6E7D-963C31875B5F}"/>
+              </a:ext>
+            </a:extLst>
+          </p:cNvPr>
+          <p:cNvSpPr txBox="1"/>
+          <p:nvPr/>
+        </p:nvSpPr>
+        <p:spPr>
+          <a:xfrm>
+            <a:off x="857134" y="3818216"/>
+            <a:ext cx="9448800" cy="369332"/>
+          </a:xfrm>
+          <a:prstGeom prst="rect">
+            <a:avLst/>
+          </a:prstGeom>
+          <a:noFill/>
+        </p:spPr>
+        <p:txBody>
+          <a:bodyPr wrap="square" rtlCol="0">
+            <a:spAutoFit/>
+          </a:bodyPr>
+          <a:lstStyle/>
+          <a:p>
+            <a:r>
+              <a:rPr lang="en-US" sz="1800" dirty="0">
+                <a:solidFill>
+                  <a:schemeClr val="bg2"/>
+                </a:solidFill>
+              </a:rPr>
+              <a:t>Tutorial Presentation for Feedback</a:t>
+            </a:r>
+            <a:endParaRPr lang="en-US" dirty="0">
+              <a:solidFill>
+                <a:schemeClr val="bg2"/>
+              </a:solidFill>
+            </a:endParaRPr>
+          </a:p>
+        </p:txBody>
+      </p:sp>
+      <p:sp>
+        <p:nvSpPr>
+          <p:cNvPr id="12" name="TextBox 11">
+            <a:extLst>
+              <a:ext uri="{FF2B5EF4-FFF2-40B4-BE49-F238E27FC236}">
+                <a16:creationId xmlns:a16="http://schemas.microsoft.com/office/drawing/2014/main" id="{51B227C4-38E9-D931-BC58-C79E9CF94F81}"/>
+              </a:ext>
+            </a:extLst>
+          </p:cNvPr>
+          <p:cNvSpPr txBox="1"/>
+          <p:nvPr/>
+        </p:nvSpPr>
+        <p:spPr>
+          <a:xfrm>
+            <a:off x="954001" y="4578834"/>
+            <a:ext cx="2495666" cy="369332"/>
+          </a:xfrm>
+          <a:prstGeom prst="rect">
+            <a:avLst/>
+          </a:prstGeom>
+          <a:noFill/>
+        </p:spPr>
+        <p:txBody>
+          <a:bodyPr wrap="square" rtlCol="0">
+            <a:spAutoFit/>
+          </a:bodyPr>
+          <a:lstStyle/>
+          <a:p>
+            <a:r>
+              <a:rPr lang="en-US" dirty="0">
+                <a:solidFill>
+                  <a:schemeClr val="bg2"/>
+                </a:solidFill>
+              </a:rPr>
+              <a:t>Date: 22/11/2024</a:t>
+            </a:r>
           </a:p>
         </p:txBody>
       </p:sp>
@@ -5102,6 +5198,14 @@
 <file path=ppt/slides/slide2.xml><?xml version="1.0" encoding="utf-8"?>
 <p:sld xmlns:a="http://schemas.openxmlformats.org/drawingml/2006/main" xmlns:r="http://schemas.openxmlformats.org/officeDocument/2006/relationships" xmlns:p="http://schemas.openxmlformats.org/presentationml/2006/main">
   <p:cSld>
+    <p:bg>
+      <p:bgPr>
+        <a:solidFill>
+          <a:schemeClr val="bg1"/>
+        </a:solidFill>
+        <a:effectLst/>
+      </p:bgPr>
+    </p:bg>
     <p:spTree>
       <p:nvGrpSpPr>
         <p:cNvPr id="1" name=""/>
@@ -5116,122 +5220,178 @@
           <a:chExt cx="0" cy="0"/>
         </a:xfrm>
       </p:grpSpPr>
-      <p:sp>
-        <p:nvSpPr>
-          <p:cNvPr id="2" name="Subtitle 1">
-            <a:extLst>
-              <a:ext uri="{FF2B5EF4-FFF2-40B4-BE49-F238E27FC236}">
-                <a16:creationId xmlns:a16="http://schemas.microsoft.com/office/drawing/2014/main" id="{6EDF47CE-5D5A-6104-A73A-4C8E09C48DA4}"/>
-              </a:ext>
-            </a:extLst>
-          </p:cNvPr>
-          <p:cNvSpPr>
-            <a:spLocks noGrp="1"/>
-          </p:cNvSpPr>
-          <p:nvPr>
-            <p:ph type="subTitle" idx="1"/>
-          </p:nvPr>
-        </p:nvSpPr>
+      <p:pic>
+        <p:nvPicPr>
+          <p:cNvPr id="6" name="Picture 5">
+            <a:extLst>
+              <a:ext uri="{FF2B5EF4-FFF2-40B4-BE49-F238E27FC236}">
+                <a16:creationId xmlns:a16="http://schemas.microsoft.com/office/drawing/2014/main" id="{5BBACEC4-9B8B-77FD-06F4-BCDA587D8E81}"/>
+              </a:ext>
+            </a:extLst>
+          </p:cNvPr>
+          <p:cNvPicPr>
+            <a:picLocks noChangeAspect="1"/>
+          </p:cNvPicPr>
+          <p:nvPr/>
+        </p:nvPicPr>
+        <p:blipFill>
+          <a:blip r:embed="rId2"/>
+          <a:stretch>
+            <a:fillRect/>
+          </a:stretch>
+        </p:blipFill>
         <p:spPr>
           <a:xfrm>
-            <a:off x="954000" y="2019168"/>
-            <a:ext cx="9769418" cy="230832"/>
+            <a:off x="643467" y="882412"/>
+            <a:ext cx="10905066" cy="3598670"/>
+          </a:xfrm>
+          <a:prstGeom prst="rect">
+            <a:avLst/>
+          </a:prstGeom>
+        </p:spPr>
+      </p:pic>
+      <p:sp>
+        <p:nvSpPr>
+          <p:cNvPr id="3" name="Footer Placeholder 2">
+            <a:extLst>
+              <a:ext uri="{FF2B5EF4-FFF2-40B4-BE49-F238E27FC236}">
+                <a16:creationId xmlns:a16="http://schemas.microsoft.com/office/drawing/2014/main" id="{E6EB5BD4-BD08-7B73-D9D9-2582DDE1B3D9}"/>
+              </a:ext>
+            </a:extLst>
+          </p:cNvPr>
+          <p:cNvSpPr>
+            <a:spLocks noGrp="1"/>
+          </p:cNvSpPr>
+          <p:nvPr>
+            <p:ph type="ftr" sz="quarter" idx="11"/>
+          </p:nvPr>
+        </p:nvSpPr>
+        <p:spPr>
+          <a:xfrm>
+            <a:off x="4038600" y="6356350"/>
+            <a:ext cx="4114800" cy="365125"/>
           </a:xfrm>
         </p:spPr>
         <p:txBody>
-          <a:bodyPr/>
+          <a:bodyPr vert="horz" lIns="91440" tIns="45720" rIns="91440" bIns="45720" rtlCol="0" anchor="ctr">
+            <a:normAutofit/>
+          </a:bodyPr>
           <a:lstStyle/>
           <a:p>
-            <a:r>
-              <a:rPr lang="en-GB" dirty="0"/>
-              <a:t>Include a snippet of your dataset, to include </a:t>
-            </a:r>
-          </a:p>
-          <a:p>
-            <a:pPr marL="742950" indent="-742950">
-              <a:buAutoNum type="arabicPeriod"/>
+            <a:pPr algn="ctr">
+              <a:lnSpc>
+                <a:spcPct val="90000"/>
+              </a:lnSpc>
+              <a:spcAft>
+                <a:spcPts val="600"/>
+              </a:spcAft>
             </a:pPr>
             <a:r>
-              <a:rPr lang="en-GB" dirty="0"/>
-              <a:t>The columns/variables you are using in your research question</a:t>
-            </a:r>
-          </a:p>
-          <a:p>
-            <a:pPr marL="742950" indent="-742950">
-              <a:buAutoNum type="arabicPeriod"/>
+              <a:rPr lang="en-US" sz="900" kern="1200">
+                <a:solidFill>
+                  <a:schemeClr val="tx1">
+                    <a:tint val="75000"/>
+                  </a:schemeClr>
+                </a:solidFill>
+                <a:latin typeface="+mn-lt"/>
+                <a:ea typeface="+mn-ea"/>
+                <a:cs typeface="+mn-cs"/>
+              </a:rPr>
+              <a:t>Analyzing the Correlation Between Movie Duration and IMDb Average Votes</a:t>
+            </a:r>
+          </a:p>
+        </p:txBody>
+      </p:sp>
+      <p:sp>
+        <p:nvSpPr>
+          <p:cNvPr id="4" name="Slide Number Placeholder 3">
+            <a:extLst>
+              <a:ext uri="{FF2B5EF4-FFF2-40B4-BE49-F238E27FC236}">
+                <a16:creationId xmlns:a16="http://schemas.microsoft.com/office/drawing/2014/main" id="{D1098E3C-BAB5-8478-26BA-5CDF4FAEFC64}"/>
+              </a:ext>
+            </a:extLst>
+          </p:cNvPr>
+          <p:cNvSpPr>
+            <a:spLocks noGrp="1"/>
+          </p:cNvSpPr>
+          <p:nvPr>
+            <p:ph type="sldNum" sz="quarter" idx="12"/>
+          </p:nvPr>
+        </p:nvSpPr>
+        <p:spPr>
+          <a:xfrm>
+            <a:off x="8610600" y="6356350"/>
+            <a:ext cx="2743200" cy="365125"/>
+          </a:xfrm>
+        </p:spPr>
+        <p:txBody>
+          <a:bodyPr vert="horz" lIns="91440" tIns="45720" rIns="91440" bIns="45720" rtlCol="0" anchor="ctr">
+            <a:normAutofit/>
+          </a:bodyPr>
+          <a:lstStyle/>
+          <a:p>
+            <a:pPr>
+              <a:spcAft>
+                <a:spcPts val="600"/>
+              </a:spcAft>
             </a:pPr>
-            <a:r>
-              <a:rPr lang="en-GB" dirty="0"/>
-              <a:t>At least 5 rows of the data</a:t>
-            </a:r>
-          </a:p>
-          <a:p>
-            <a:pPr marL="742950" indent="-742950">
-              <a:buAutoNum type="arabicPeriod"/>
-            </a:pPr>
-            <a:r>
-              <a:rPr lang="en-GB" dirty="0"/>
-              <a:t>Tell us how many rows your dataset has.</a:t>
-            </a:r>
-          </a:p>
-        </p:txBody>
-      </p:sp>
-      <p:sp>
-        <p:nvSpPr>
-          <p:cNvPr id="3" name="Footer Placeholder 2">
-            <a:extLst>
-              <a:ext uri="{FF2B5EF4-FFF2-40B4-BE49-F238E27FC236}">
-                <a16:creationId xmlns:a16="http://schemas.microsoft.com/office/drawing/2014/main" id="{E6EB5BD4-BD08-7B73-D9D9-2582DDE1B3D9}"/>
-              </a:ext>
-            </a:extLst>
-          </p:cNvPr>
-          <p:cNvSpPr>
-            <a:spLocks noGrp="1"/>
-          </p:cNvSpPr>
-          <p:nvPr>
-            <p:ph type="ftr" sz="quarter" idx="11"/>
-          </p:nvPr>
-        </p:nvSpPr>
-        <p:spPr/>
-        <p:txBody>
-          <a:bodyPr/>
-          <a:lstStyle/>
-          <a:p>
-            <a:r>
-              <a:rPr lang="en-GB"/>
-              <a:t>PRESENTATION TITLE (ADD VIA INSERT, HEADER &amp; FOOTER)</a:t>
-            </a:r>
-            <a:endParaRPr lang="en-GB" dirty="0"/>
-          </a:p>
-        </p:txBody>
-      </p:sp>
-      <p:sp>
-        <p:nvSpPr>
-          <p:cNvPr id="4" name="Slide Number Placeholder 3">
-            <a:extLst>
-              <a:ext uri="{FF2B5EF4-FFF2-40B4-BE49-F238E27FC236}">
-                <a16:creationId xmlns:a16="http://schemas.microsoft.com/office/drawing/2014/main" id="{D1098E3C-BAB5-8478-26BA-5CDF4FAEFC64}"/>
-              </a:ext>
-            </a:extLst>
-          </p:cNvPr>
-          <p:cNvSpPr>
-            <a:spLocks noGrp="1"/>
-          </p:cNvSpPr>
-          <p:nvPr>
-            <p:ph type="sldNum" sz="quarter" idx="12"/>
-          </p:nvPr>
-        </p:nvSpPr>
-        <p:spPr/>
-        <p:txBody>
-          <a:bodyPr/>
-          <a:lstStyle/>
-          <a:p>
             <a:fld id="{E4D355CA-84B7-41B1-B164-8BB439CC7C6B}" type="slidenum">
-              <a:rPr lang="en-GB" smtClean="0"/>
-              <a:pPr/>
+              <a:rPr lang="en-US" sz="1200" smtClean="0">
+                <a:solidFill>
+                  <a:schemeClr val="tx1">
+                    <a:tint val="75000"/>
+                  </a:schemeClr>
+                </a:solidFill>
+              </a:rPr>
+              <a:pPr>
+                <a:spcAft>
+                  <a:spcPts val="600"/>
+                </a:spcAft>
+              </a:pPr>
               <a:t>2</a:t>
             </a:fld>
-            <a:endParaRPr lang="en-GB" dirty="0"/>
+            <a:endParaRPr lang="en-US" sz="1200">
+              <a:solidFill>
+                <a:schemeClr val="tx1">
+                  <a:tint val="75000"/>
+                </a:schemeClr>
+              </a:solidFill>
+            </a:endParaRPr>
+          </a:p>
+        </p:txBody>
+      </p:sp>
+      <p:sp>
+        <p:nvSpPr>
+          <p:cNvPr id="7" name="TextBox 6">
+            <a:extLst>
+              <a:ext uri="{FF2B5EF4-FFF2-40B4-BE49-F238E27FC236}">
+                <a16:creationId xmlns:a16="http://schemas.microsoft.com/office/drawing/2014/main" id="{0B34B97E-B9F9-A2B2-1E74-3C3E54EE0DB7}"/>
+              </a:ext>
+            </a:extLst>
+          </p:cNvPr>
+          <p:cNvSpPr txBox="1"/>
+          <p:nvPr/>
+        </p:nvSpPr>
+        <p:spPr>
+          <a:xfrm>
+            <a:off x="643467" y="599768"/>
+            <a:ext cx="4960920" cy="369332"/>
+          </a:xfrm>
+          <a:prstGeom prst="rect">
+            <a:avLst/>
+          </a:prstGeom>
+          <a:noFill/>
+        </p:spPr>
+        <p:txBody>
+          <a:bodyPr wrap="square" rtlCol="0">
+            <a:spAutoFit/>
+          </a:bodyPr>
+          <a:lstStyle/>
+          <a:p>
+            <a:r>
+              <a:rPr lang="en-US" dirty="0"/>
+              <a:t>Sample </a:t>
+            </a:r>
           </a:p>
         </p:txBody>
       </p:sp>
@@ -7852,6 +8012,15 @@
 </file>
 
 <file path=customXml/item2.xml><?xml version="1.0" encoding="utf-8"?>
+<?mso-contentType ?>
+<FormTemplates xmlns="http://schemas.microsoft.com/sharepoint/v3/contenttype/forms">
+  <Display>DocumentLibraryForm</Display>
+  <Edit>DocumentLibraryForm</Edit>
+  <New>DocumentLibraryForm</New>
+</FormTemplates>
+</file>
+
+<file path=customXml/item3.xml><?xml version="1.0" encoding="utf-8"?>
 <ct:contentTypeSchema xmlns:ct="http://schemas.microsoft.com/office/2006/metadata/contentType" xmlns:ma="http://schemas.microsoft.com/office/2006/metadata/properties/metaAttributes" ct:_="" ma:_="" ma:contentTypeName="Document" ma:contentTypeID="0x01010026DBA85F447B164191BB36C258697B67" ma:contentTypeVersion="14" ma:contentTypeDescription="Create a new document." ma:contentTypeScope="" ma:versionID="ea511d05ca7f895fe9556935b5c9af34">
   <xsd:schema xmlns:xsd="http://www.w3.org/2001/XMLSchema" xmlns:xs="http://www.w3.org/2001/XMLSchema" xmlns:p="http://schemas.microsoft.com/office/2006/metadata/properties" xmlns:ns2="4ad138b4-2b68-4b70-945d-07f8f18b1c9a" xmlns:ns3="3c474641-ec36-472f-b125-6b1b0910eaa4" targetNamespace="http://schemas.microsoft.com/office/2006/metadata/properties" ma:root="true" ma:fieldsID="662270106d7a7e100bcac2c5f8d29899" ns2:_="" ns3:_="">
     <xsd:import namespace="4ad138b4-2b68-4b70-945d-07f8f18b1c9a"/>
@@ -8076,15 +8245,6 @@
 </ct:contentTypeSchema>
 </file>
 
-<file path=customXml/item3.xml><?xml version="1.0" encoding="utf-8"?>
-<?mso-contentType ?>
-<FormTemplates xmlns="http://schemas.microsoft.com/sharepoint/v3/contenttype/forms">
-  <Display>DocumentLibraryForm</Display>
-  <Edit>DocumentLibraryForm</Edit>
-  <New>DocumentLibraryForm</New>
-</FormTemplates>
-</file>
-
 <file path=customXml/itemProps1.xml><?xml version="1.0" encoding="utf-8"?>
 <ds:datastoreItem xmlns:ds="http://schemas.openxmlformats.org/officeDocument/2006/customXml" ds:itemID="{EDD1FC41-23C7-41B0-B5F9-BF4CD38AD2ED}">
   <ds:schemaRefs>
@@ -8103,6 +8263,14 @@
 </file>
 
 <file path=customXml/itemProps2.xml><?xml version="1.0" encoding="utf-8"?>
+<ds:datastoreItem xmlns:ds="http://schemas.openxmlformats.org/officeDocument/2006/customXml" ds:itemID="{91C521DD-2673-4EE6-BB9B-DC5C3320FFBB}">
+  <ds:schemaRefs>
+    <ds:schemaRef ds:uri="http://schemas.microsoft.com/sharepoint/v3/contenttype/forms"/>
+  </ds:schemaRefs>
+</ds:datastoreItem>
+</file>
+
+<file path=customXml/itemProps3.xml><?xml version="1.0" encoding="utf-8"?>
 <ds:datastoreItem xmlns:ds="http://schemas.openxmlformats.org/officeDocument/2006/customXml" ds:itemID="{421B8C57-903D-4D0E-8336-7B512F760CD1}">
   <ds:schemaRefs>
     <ds:schemaRef ds:uri="http://schemas.microsoft.com/office/2006/metadata/contentType"/>
@@ -8119,12 +8287,4 @@
     <ds:schemaRef ds:uri="http://schemas.microsoft.com/internal/obd"/>
   </ds:schemaRefs>
 </ds:datastoreItem>
-</file>
-
-<file path=customXml/itemProps3.xml><?xml version="1.0" encoding="utf-8"?>
-<ds:datastoreItem xmlns:ds="http://schemas.openxmlformats.org/officeDocument/2006/customXml" ds:itemID="{91C521DD-2673-4EE6-BB9B-DC5C3320FFBB}">
-  <ds:schemaRefs>
-    <ds:schemaRef ds:uri="http://schemas.microsoft.com/sharepoint/v3/contenttype/forms"/>
-  </ds:schemaRefs>
-</ds:datastoreItem>
 </file>
</xml_diff>